<commit_message>
updated ppt file and result file depend on modified code
</commit_message>
<xml_diff>
--- a/kopo08_20210413_JAVA ExchangeMoney.pptx
+++ b/kopo08_20210413_JAVA ExchangeMoney.pptx
@@ -1080,37 +1080,6 @@
       </p:grpSpPr>
       <p:pic>
         <p:nvPicPr>
-          <p:cNvPr id="2" name="그림 1"/>
-          <p:cNvPicPr>
-            <a:picLocks noChangeAspect="1"/>
-          </p:cNvPicPr>
-          <p:nvPr/>
-        </p:nvPicPr>
-        <p:blipFill>
-          <a:blip r:embed="rId2"/>
-          <a:stretch>
-            <a:fillRect/>
-          </a:stretch>
-        </p:blipFill>
-        <p:spPr>
-          <a:xfrm>
-            <a:off x="755801" y="1327759"/>
-            <a:ext cx="4943475" cy="5029200"/>
-          </a:xfrm>
-          <a:prstGeom prst="rect">
-            <a:avLst/>
-          </a:prstGeom>
-          <a:ln>
-            <a:solidFill>
-              <a:schemeClr val="bg1">
-                <a:lumMod val="85000"/>
-              </a:schemeClr>
-            </a:solidFill>
-          </a:ln>
-        </p:spPr>
-      </p:pic>
-      <p:pic>
-        <p:nvPicPr>
           <p:cNvPr id="3" name="그림 2"/>
           <p:cNvPicPr>
             <a:picLocks noChangeAspect="1"/>
@@ -1118,7 +1087,7 @@
           <p:nvPr/>
         </p:nvPicPr>
         <p:blipFill>
-          <a:blip r:embed="rId3"/>
+          <a:blip r:embed="rId2"/>
           <a:stretch>
             <a:fillRect/>
           </a:stretch>
@@ -1237,6 +1206,37 @@
           </a:p>
         </p:txBody>
       </p:sp>
+      <p:pic>
+        <p:nvPicPr>
+          <p:cNvPr id="6" name="그림 5"/>
+          <p:cNvPicPr>
+            <a:picLocks noChangeAspect="1"/>
+          </p:cNvPicPr>
+          <p:nvPr/>
+        </p:nvPicPr>
+        <p:blipFill>
+          <a:blip r:embed="rId3"/>
+          <a:stretch>
+            <a:fillRect/>
+          </a:stretch>
+        </p:blipFill>
+        <p:spPr>
+          <a:xfrm>
+            <a:off x="258951" y="1906967"/>
+            <a:ext cx="5761307" cy="3089733"/>
+          </a:xfrm>
+          <a:prstGeom prst="rect">
+            <a:avLst/>
+          </a:prstGeom>
+          <a:ln>
+            <a:solidFill>
+              <a:schemeClr val="bg1">
+                <a:lumMod val="85000"/>
+              </a:schemeClr>
+            </a:solidFill>
+          </a:ln>
+        </p:spPr>
+      </p:pic>
     </p:spTree>
     <p:extLst>
       <p:ext uri="{BB962C8B-B14F-4D97-AF65-F5344CB8AC3E}">
@@ -2919,7 +2919,7 @@
       </p:sp>
       <p:pic>
         <p:nvPicPr>
-          <p:cNvPr id="6" name="그림 5"/>
+          <p:cNvPr id="7" name="그림 6"/>
           <p:cNvPicPr>
             <a:picLocks noChangeAspect="1"/>
           </p:cNvPicPr>
@@ -2933,8 +2933,8 @@
         </p:blipFill>
         <p:spPr>
           <a:xfrm>
-            <a:off x="991980" y="776821"/>
-            <a:ext cx="4937040" cy="5573875"/>
+            <a:off x="7176631" y="958670"/>
+            <a:ext cx="4171950" cy="5210175"/>
           </a:xfrm>
           <a:prstGeom prst="rect">
             <a:avLst/>
@@ -2950,7 +2950,7 @@
       </p:pic>
       <p:pic>
         <p:nvPicPr>
-          <p:cNvPr id="7" name="그림 6"/>
+          <p:cNvPr id="2" name="그림 1"/>
           <p:cNvPicPr>
             <a:picLocks noChangeAspect="1"/>
           </p:cNvPicPr>
@@ -2964,8 +2964,8 @@
         </p:blipFill>
         <p:spPr>
           <a:xfrm>
-            <a:off x="7176631" y="958670"/>
-            <a:ext cx="4171950" cy="5210175"/>
+            <a:off x="600390" y="870926"/>
+            <a:ext cx="5199306" cy="5385661"/>
           </a:xfrm>
           <a:prstGeom prst="rect">
             <a:avLst/>

</xml_diff>